<commit_message>
[LAB6] Added mvc sample
</commit_message>
<xml_diff>
--- a/LAB6/MVC.pptx
+++ b/LAB6/MVC.pptx
@@ -266,7 +266,7 @@
           <a:p>
             <a:fld id="{43036BA2-3A06-4B61-B146-C9186FAC714E}" type="datetimeFigureOut">
               <a:rPr lang="en-US" smtClean="0"/>
-              <a:t>10/30/2019</a:t>
+              <a:t>10/31/2019</a:t>
             </a:fld>
             <a:endParaRPr lang="en-US"/>
           </a:p>
@@ -466,7 +466,7 @@
           <a:p>
             <a:fld id="{43036BA2-3A06-4B61-B146-C9186FAC714E}" type="datetimeFigureOut">
               <a:rPr lang="en-US" smtClean="0"/>
-              <a:t>10/30/2019</a:t>
+              <a:t>10/31/2019</a:t>
             </a:fld>
             <a:endParaRPr lang="en-US"/>
           </a:p>
@@ -676,7 +676,7 @@
           <a:p>
             <a:fld id="{43036BA2-3A06-4B61-B146-C9186FAC714E}" type="datetimeFigureOut">
               <a:rPr lang="en-US" smtClean="0"/>
-              <a:t>10/30/2019</a:t>
+              <a:t>10/31/2019</a:t>
             </a:fld>
             <a:endParaRPr lang="en-US"/>
           </a:p>
@@ -876,7 +876,7 @@
           <a:p>
             <a:fld id="{43036BA2-3A06-4B61-B146-C9186FAC714E}" type="datetimeFigureOut">
               <a:rPr lang="en-US" smtClean="0"/>
-              <a:t>10/30/2019</a:t>
+              <a:t>10/31/2019</a:t>
             </a:fld>
             <a:endParaRPr lang="en-US"/>
           </a:p>
@@ -1152,7 +1152,7 @@
           <a:p>
             <a:fld id="{43036BA2-3A06-4B61-B146-C9186FAC714E}" type="datetimeFigureOut">
               <a:rPr lang="en-US" smtClean="0"/>
-              <a:t>10/30/2019</a:t>
+              <a:t>10/31/2019</a:t>
             </a:fld>
             <a:endParaRPr lang="en-US"/>
           </a:p>
@@ -1420,7 +1420,7 @@
           <a:p>
             <a:fld id="{43036BA2-3A06-4B61-B146-C9186FAC714E}" type="datetimeFigureOut">
               <a:rPr lang="en-US" smtClean="0"/>
-              <a:t>10/30/2019</a:t>
+              <a:t>10/31/2019</a:t>
             </a:fld>
             <a:endParaRPr lang="en-US"/>
           </a:p>
@@ -1835,7 +1835,7 @@
           <a:p>
             <a:fld id="{43036BA2-3A06-4B61-B146-C9186FAC714E}" type="datetimeFigureOut">
               <a:rPr lang="en-US" smtClean="0"/>
-              <a:t>10/30/2019</a:t>
+              <a:t>10/31/2019</a:t>
             </a:fld>
             <a:endParaRPr lang="en-US"/>
           </a:p>
@@ -1977,7 +1977,7 @@
           <a:p>
             <a:fld id="{43036BA2-3A06-4B61-B146-C9186FAC714E}" type="datetimeFigureOut">
               <a:rPr lang="en-US" smtClean="0"/>
-              <a:t>10/30/2019</a:t>
+              <a:t>10/31/2019</a:t>
             </a:fld>
             <a:endParaRPr lang="en-US"/>
           </a:p>
@@ -2090,7 +2090,7 @@
           <a:p>
             <a:fld id="{43036BA2-3A06-4B61-B146-C9186FAC714E}" type="datetimeFigureOut">
               <a:rPr lang="en-US" smtClean="0"/>
-              <a:t>10/30/2019</a:t>
+              <a:t>10/31/2019</a:t>
             </a:fld>
             <a:endParaRPr lang="en-US"/>
           </a:p>
@@ -2403,7 +2403,7 @@
           <a:p>
             <a:fld id="{43036BA2-3A06-4B61-B146-C9186FAC714E}" type="datetimeFigureOut">
               <a:rPr lang="en-US" smtClean="0"/>
-              <a:t>10/30/2019</a:t>
+              <a:t>10/31/2019</a:t>
             </a:fld>
             <a:endParaRPr lang="en-US"/>
           </a:p>
@@ -2692,7 +2692,7 @@
           <a:p>
             <a:fld id="{43036BA2-3A06-4B61-B146-C9186FAC714E}" type="datetimeFigureOut">
               <a:rPr lang="en-US" smtClean="0"/>
-              <a:t>10/30/2019</a:t>
+              <a:t>10/31/2019</a:t>
             </a:fld>
             <a:endParaRPr lang="en-US"/>
           </a:p>
@@ -2935,7 +2935,7 @@
           <a:p>
             <a:fld id="{43036BA2-3A06-4B61-B146-C9186FAC714E}" type="datetimeFigureOut">
               <a:rPr lang="en-US" smtClean="0"/>
-              <a:t>10/30/2019</a:t>
+              <a:t>10/31/2019</a:t>
             </a:fld>
             <a:endParaRPr lang="en-US"/>
           </a:p>
@@ -4441,33 +4441,75 @@
           </a:p>
           <a:p>
             <a:r>
-              <a:rPr lang="en-US" dirty="0"/>
+              <a:rPr lang="en-US" dirty="0">
+                <a:solidFill>
+                  <a:schemeClr val="bg2">
+                    <a:lumMod val="50000"/>
+                  </a:schemeClr>
+                </a:solidFill>
+              </a:rPr>
               <a:t>Visual Studio Code</a:t>
             </a:r>
           </a:p>
           <a:p>
             <a:pPr lvl="1"/>
             <a:r>
-              <a:rPr lang="en-US" dirty="0"/>
+              <a:rPr lang="en-US" dirty="0">
+                <a:solidFill>
+                  <a:schemeClr val="bg2">
+                    <a:lumMod val="50000"/>
+                  </a:schemeClr>
+                </a:solidFill>
+              </a:rPr>
               <a:t>dotnet new </a:t>
             </a:r>
             <a:r>
-              <a:rPr lang="en-US" dirty="0" err="1"/>
+              <a:rPr lang="en-US" dirty="0" err="1">
+                <a:solidFill>
+                  <a:schemeClr val="bg2">
+                    <a:lumMod val="50000"/>
+                  </a:schemeClr>
+                </a:solidFill>
+              </a:rPr>
               <a:t>mvc</a:t>
             </a:r>
-            <a:endParaRPr lang="en-US" dirty="0"/>
+            <a:endParaRPr lang="en-US" dirty="0">
+              <a:solidFill>
+                <a:schemeClr val="bg2">
+                  <a:lumMod val="50000"/>
+                </a:schemeClr>
+              </a:solidFill>
+            </a:endParaRPr>
           </a:p>
           <a:p>
             <a:pPr lvl="1"/>
             <a:r>
-              <a:rPr lang="en-US" dirty="0"/>
+              <a:rPr lang="en-US" dirty="0">
+                <a:solidFill>
+                  <a:schemeClr val="bg2">
+                    <a:lumMod val="50000"/>
+                  </a:schemeClr>
+                </a:solidFill>
+              </a:rPr>
               <a:t>dotnet new </a:t>
             </a:r>
             <a:r>
-              <a:rPr lang="en-US" dirty="0" err="1"/>
+              <a:rPr lang="en-US" dirty="0" err="1">
+                <a:solidFill>
+                  <a:schemeClr val="bg2">
+                    <a:lumMod val="50000"/>
+                  </a:schemeClr>
+                </a:solidFill>
+              </a:rPr>
               <a:t>xunit</a:t>
             </a:r>
-            <a:endParaRPr lang="en-US" dirty="0"/>
+            <a:endParaRPr lang="en-US" dirty="0">
+              <a:solidFill>
+                <a:schemeClr val="bg2">
+                  <a:lumMod val="50000"/>
+                </a:schemeClr>
+              </a:solidFill>
+            </a:endParaRPr>
           </a:p>
         </p:txBody>
       </p:sp>

</xml_diff>

<commit_message>
[LAB6] - Added drop down menu for machine type - Updated presentation
</commit_message>
<xml_diff>
--- a/LAB6/MVC.pptx
+++ b/LAB6/MVC.pptx
@@ -4441,7 +4441,7 @@
           </a:p>
           <a:p>
             <a:r>
-              <a:rPr lang="en-US" dirty="0">
+              <a:rPr lang="en-US" i="1" dirty="0">
                 <a:solidFill>
                   <a:schemeClr val="bg2">
                     <a:lumMod val="50000"/>
@@ -4454,7 +4454,7 @@
           <a:p>
             <a:pPr lvl="1"/>
             <a:r>
-              <a:rPr lang="en-US" dirty="0">
+              <a:rPr lang="en-US" i="1" dirty="0">
                 <a:solidFill>
                   <a:schemeClr val="bg2">
                     <a:lumMod val="50000"/>
@@ -4464,7 +4464,7 @@
               <a:t>dotnet new </a:t>
             </a:r>
             <a:r>
-              <a:rPr lang="en-US" dirty="0" err="1">
+              <a:rPr lang="en-US" i="1" dirty="0" err="1">
                 <a:solidFill>
                   <a:schemeClr val="bg2">
                     <a:lumMod val="50000"/>
@@ -4473,7 +4473,7 @@
               </a:rPr>
               <a:t>mvc</a:t>
             </a:r>
-            <a:endParaRPr lang="en-US" dirty="0">
+            <a:endParaRPr lang="en-US" i="1" dirty="0">
               <a:solidFill>
                 <a:schemeClr val="bg2">
                   <a:lumMod val="50000"/>
@@ -4484,7 +4484,7 @@
           <a:p>
             <a:pPr lvl="1"/>
             <a:r>
-              <a:rPr lang="en-US" dirty="0">
+              <a:rPr lang="en-US" i="1" dirty="0">
                 <a:solidFill>
                   <a:schemeClr val="bg2">
                     <a:lumMod val="50000"/>
@@ -4494,7 +4494,7 @@
               <a:t>dotnet new </a:t>
             </a:r>
             <a:r>
-              <a:rPr lang="en-US" dirty="0" err="1">
+              <a:rPr lang="en-US" i="1" dirty="0" err="1">
                 <a:solidFill>
                   <a:schemeClr val="bg2">
                     <a:lumMod val="50000"/>
@@ -4503,7 +4503,7 @@
               </a:rPr>
               <a:t>xunit</a:t>
             </a:r>
-            <a:endParaRPr lang="en-US" dirty="0">
+            <a:endParaRPr lang="en-US" i="1" dirty="0">
               <a:solidFill>
                 <a:schemeClr val="bg2">
                   <a:lumMod val="50000"/>

</xml_diff>